<commit_message>
Added Final Zip to Milestone 3
</commit_message>
<xml_diff>
--- a/Milestone 4/Green Group Milestone 4.pptx
+++ b/Milestone 4/Green Group Milestone 4.pptx
@@ -272,7 +272,7 @@
           <a:p>
             <a:fld id="{99B10CC0-AF4B-E348-B54D-14F7FDD72637}" type="datetimeFigureOut">
               <a:rPr lang="en-US" smtClean="0"/>
-              <a:t>12/10/25</a:t>
+              <a:t>12/11/25</a:t>
             </a:fld>
             <a:endParaRPr lang="en-US"/>
           </a:p>
@@ -470,7 +470,7 @@
           <a:p>
             <a:fld id="{99B10CC0-AF4B-E348-B54D-14F7FDD72637}" type="datetimeFigureOut">
               <a:rPr lang="en-US" smtClean="0"/>
-              <a:t>12/10/25</a:t>
+              <a:t>12/11/25</a:t>
             </a:fld>
             <a:endParaRPr lang="en-US"/>
           </a:p>
@@ -678,7 +678,7 @@
           <a:p>
             <a:fld id="{99B10CC0-AF4B-E348-B54D-14F7FDD72637}" type="datetimeFigureOut">
               <a:rPr lang="en-US" smtClean="0"/>
-              <a:t>12/10/25</a:t>
+              <a:t>12/11/25</a:t>
             </a:fld>
             <a:endParaRPr lang="en-US"/>
           </a:p>
@@ -876,7 +876,7 @@
           <a:p>
             <a:fld id="{99B10CC0-AF4B-E348-B54D-14F7FDD72637}" type="datetimeFigureOut">
               <a:rPr lang="en-US" smtClean="0"/>
-              <a:t>12/10/25</a:t>
+              <a:t>12/11/25</a:t>
             </a:fld>
             <a:endParaRPr lang="en-US"/>
           </a:p>
@@ -1151,7 +1151,7 @@
           <a:p>
             <a:fld id="{99B10CC0-AF4B-E348-B54D-14F7FDD72637}" type="datetimeFigureOut">
               <a:rPr lang="en-US" smtClean="0"/>
-              <a:t>12/10/25</a:t>
+              <a:t>12/11/25</a:t>
             </a:fld>
             <a:endParaRPr lang="en-US"/>
           </a:p>
@@ -1416,7 +1416,7 @@
           <a:p>
             <a:fld id="{99B10CC0-AF4B-E348-B54D-14F7FDD72637}" type="datetimeFigureOut">
               <a:rPr lang="en-US" smtClean="0"/>
-              <a:t>12/10/25</a:t>
+              <a:t>12/11/25</a:t>
             </a:fld>
             <a:endParaRPr lang="en-US"/>
           </a:p>
@@ -1828,7 +1828,7 @@
           <a:p>
             <a:fld id="{99B10CC0-AF4B-E348-B54D-14F7FDD72637}" type="datetimeFigureOut">
               <a:rPr lang="en-US" smtClean="0"/>
-              <a:t>12/10/25</a:t>
+              <a:t>12/11/25</a:t>
             </a:fld>
             <a:endParaRPr lang="en-US"/>
           </a:p>
@@ -1969,7 +1969,7 @@
           <a:p>
             <a:fld id="{99B10CC0-AF4B-E348-B54D-14F7FDD72637}" type="datetimeFigureOut">
               <a:rPr lang="en-US" smtClean="0"/>
-              <a:t>12/10/25</a:t>
+              <a:t>12/11/25</a:t>
             </a:fld>
             <a:endParaRPr lang="en-US"/>
           </a:p>
@@ -2082,7 +2082,7 @@
           <a:p>
             <a:fld id="{99B10CC0-AF4B-E348-B54D-14F7FDD72637}" type="datetimeFigureOut">
               <a:rPr lang="en-US" smtClean="0"/>
-              <a:t>12/10/25</a:t>
+              <a:t>12/11/25</a:t>
             </a:fld>
             <a:endParaRPr lang="en-US"/>
           </a:p>
@@ -2393,7 +2393,7 @@
           <a:p>
             <a:fld id="{99B10CC0-AF4B-E348-B54D-14F7FDD72637}" type="datetimeFigureOut">
               <a:rPr lang="en-US" smtClean="0"/>
-              <a:t>12/10/25</a:t>
+              <a:t>12/11/25</a:t>
             </a:fld>
             <a:endParaRPr lang="en-US"/>
           </a:p>
@@ -2681,7 +2681,7 @@
           <a:p>
             <a:fld id="{99B10CC0-AF4B-E348-B54D-14F7FDD72637}" type="datetimeFigureOut">
               <a:rPr lang="en-US" smtClean="0"/>
-              <a:t>12/10/25</a:t>
+              <a:t>12/11/25</a:t>
             </a:fld>
             <a:endParaRPr lang="en-US"/>
           </a:p>
@@ -2922,7 +2922,7 @@
           <a:p>
             <a:fld id="{99B10CC0-AF4B-E348-B54D-14F7FDD72637}" type="datetimeFigureOut">
               <a:rPr lang="en-US" smtClean="0"/>
-              <a:t>12/10/25</a:t>
+              <a:t>12/11/25</a:t>
             </a:fld>
             <a:endParaRPr lang="en-US"/>
           </a:p>
@@ -6588,10 +6588,10 @@
       </p:grpSp>
       <p:pic>
         <p:nvPicPr>
-          <p:cNvPr id="6" name="Picture 5" descr="A black screen with white text&#10;&#10;AI-generated content may be incorrect.">
+          <p:cNvPr id="5" name="Picture 4" descr="A screen shot of a report&#10;&#10;AI-generated content may be incorrect.">
             <a:extLst>
               <a:ext uri="{FF2B5EF4-FFF2-40B4-BE49-F238E27FC236}">
-                <a16:creationId xmlns:a16="http://schemas.microsoft.com/office/drawing/2014/main" id="{B6AA4CE7-53AB-0B7F-23C7-375E2E477603}"/>
+                <a16:creationId xmlns:a16="http://schemas.microsoft.com/office/drawing/2014/main" id="{6727F3EB-E0F0-8E17-A7B2-AB5163AF5B4A}"/>
               </a:ext>
             </a:extLst>
           </p:cNvPr>
@@ -6608,8 +6608,8 @@
         </p:blipFill>
         <p:spPr>
           <a:xfrm>
-            <a:off x="6429378" y="3820849"/>
-            <a:ext cx="4954693" cy="1251059"/>
+            <a:off x="6096000" y="3848725"/>
+            <a:ext cx="5939585" cy="1325880"/>
           </a:xfrm>
           <a:prstGeom prst="rect">
             <a:avLst/>
@@ -9270,10 +9270,10 @@
       </p:grpSp>
       <p:pic>
         <p:nvPicPr>
-          <p:cNvPr id="5" name="Picture 4" descr="A screen shot of a computer code&#10;&#10;AI-generated content may be incorrect.">
+          <p:cNvPr id="6" name="Picture 5" descr="A screen shot of a computer&#10;&#10;AI-generated content may be incorrect.">
             <a:extLst>
               <a:ext uri="{FF2B5EF4-FFF2-40B4-BE49-F238E27FC236}">
-                <a16:creationId xmlns:a16="http://schemas.microsoft.com/office/drawing/2014/main" id="{F92D7100-E069-36DE-9959-E80F3DA32FEF}"/>
+                <a16:creationId xmlns:a16="http://schemas.microsoft.com/office/drawing/2014/main" id="{ED1C96E0-2917-3ECA-82DF-231480BFAD11}"/>
               </a:ext>
             </a:extLst>
           </p:cNvPr>
@@ -9290,8 +9290,8 @@
         </p:blipFill>
         <p:spPr>
           <a:xfrm>
-            <a:off x="6429378" y="3771301"/>
-            <a:ext cx="4954693" cy="1350154"/>
+            <a:off x="6735935" y="2897493"/>
+            <a:ext cx="4908868" cy="3087478"/>
           </a:xfrm>
           <a:prstGeom prst="rect">
             <a:avLst/>
@@ -20513,10 +20513,10 @@
       </p:grpSp>
       <p:pic>
         <p:nvPicPr>
-          <p:cNvPr id="5" name="Picture 4" descr="A screen shot of a computer screen&#10;&#10;AI-generated content may be incorrect.">
+          <p:cNvPr id="6" name="Picture 5" descr="A screenshot of a computer&#10;&#10;AI-generated content may be incorrect.">
             <a:extLst>
               <a:ext uri="{FF2B5EF4-FFF2-40B4-BE49-F238E27FC236}">
-                <a16:creationId xmlns:a16="http://schemas.microsoft.com/office/drawing/2014/main" id="{24E1A29E-5898-63C8-3DA7-9450431C07A8}"/>
+                <a16:creationId xmlns:a16="http://schemas.microsoft.com/office/drawing/2014/main" id="{B53569AF-4D11-F1C8-3D19-23F557EA2D53}"/>
               </a:ext>
             </a:extLst>
           </p:cNvPr>
@@ -20533,8 +20533,8 @@
         </p:blipFill>
         <p:spPr>
           <a:xfrm>
-            <a:off x="6429378" y="3882782"/>
-            <a:ext cx="4954693" cy="1127193"/>
+            <a:off x="6094476" y="3429000"/>
+            <a:ext cx="5600207" cy="1404440"/>
           </a:xfrm>
           <a:prstGeom prst="rect">
             <a:avLst/>
@@ -23174,10 +23174,10 @@
       </p:grpSp>
       <p:pic>
         <p:nvPicPr>
-          <p:cNvPr id="5" name="Picture 4" descr="A black screen with white text&#10;&#10;AI-generated content may be incorrect.">
+          <p:cNvPr id="6" name="Picture 5" descr="A black screen with white text&#10;&#10;AI-generated content may be incorrect.">
             <a:extLst>
               <a:ext uri="{FF2B5EF4-FFF2-40B4-BE49-F238E27FC236}">
-                <a16:creationId xmlns:a16="http://schemas.microsoft.com/office/drawing/2014/main" id="{12861175-6058-4B46-5902-C935003B95D9}"/>
+                <a16:creationId xmlns:a16="http://schemas.microsoft.com/office/drawing/2014/main" id="{CE39E304-676E-A55D-E360-1BCD9079AAB0}"/>
               </a:ext>
             </a:extLst>
           </p:cNvPr>
@@ -23194,8 +23194,8 @@
         </p:blipFill>
         <p:spPr>
           <a:xfrm>
-            <a:off x="6429378" y="3498794"/>
-            <a:ext cx="4954693" cy="1895169"/>
+            <a:off x="5876881" y="3350193"/>
+            <a:ext cx="5986873" cy="1941444"/>
           </a:xfrm>
           <a:prstGeom prst="rect">
             <a:avLst/>
@@ -25828,10 +25828,10 @@
       </p:grpSp>
       <p:pic>
         <p:nvPicPr>
-          <p:cNvPr id="5" name="Picture 4" descr="A black screen with white text&#10;&#10;AI-generated content may be incorrect.">
+          <p:cNvPr id="6" name="Picture 5" descr="A screen shot of a computer screen&#10;&#10;AI-generated content may be incorrect.">
             <a:extLst>
               <a:ext uri="{FF2B5EF4-FFF2-40B4-BE49-F238E27FC236}">
-                <a16:creationId xmlns:a16="http://schemas.microsoft.com/office/drawing/2014/main" id="{6A83072D-9627-54E8-CBEC-A0449824A245}"/>
+                <a16:creationId xmlns:a16="http://schemas.microsoft.com/office/drawing/2014/main" id="{339BBCDB-2CEC-8AC4-33A3-4732024CFA9F}"/>
               </a:ext>
             </a:extLst>
           </p:cNvPr>
@@ -25848,8 +25848,8 @@
         </p:blipFill>
         <p:spPr>
           <a:xfrm>
-            <a:off x="6429378" y="3858009"/>
-            <a:ext cx="4954693" cy="1176739"/>
+            <a:off x="6426381" y="3308839"/>
+            <a:ext cx="5270500" cy="1752600"/>
           </a:xfrm>
           <a:prstGeom prst="rect">
             <a:avLst/>

</xml_diff>

<commit_message>
Added PPT to Milestone 5
</commit_message>
<xml_diff>
--- a/Milestone 4/Green Group Milestone 4.pptx
+++ b/Milestone 4/Green Group Milestone 4.pptx
@@ -13105,6 +13105,14 @@
 <file path=ppt/slides/slide5.xml><?xml version="1.0" encoding="utf-8"?>
 <p:sld xmlns:a="http://schemas.openxmlformats.org/drawingml/2006/main" xmlns:r="http://schemas.openxmlformats.org/officeDocument/2006/relationships" xmlns:p="http://schemas.openxmlformats.org/presentationml/2006/main">
   <p:cSld>
+    <p:bg>
+      <p:bgPr>
+        <a:solidFill>
+          <a:schemeClr val="bg1"/>
+        </a:solidFill>
+        <a:effectLst/>
+      </p:bgPr>
+    </p:bg>
     <p:spTree>
       <p:nvGrpSpPr>
         <p:cNvPr id="1" name=""/>
@@ -13119,6 +13127,66 @@
           <a:chExt cx="0" cy="0"/>
         </a:xfrm>
       </p:grpSpPr>
+      <p:sp useBgFill="1">
+        <p:nvSpPr>
+          <p:cNvPr id="11" name="Rectangle 10">
+            <a:extLst>
+              <a:ext uri="{FF2B5EF4-FFF2-40B4-BE49-F238E27FC236}">
+                <a16:creationId xmlns:a16="http://schemas.microsoft.com/office/drawing/2014/main" id="{2B97F24A-32CE-4C1C-A50D-3016B394DCFB}"/>
+              </a:ext>
+              <a:ext uri="{C183D7F6-B498-43B3-948B-1728B52AA6E4}">
+                <adec:decorative xmlns:adec="http://schemas.microsoft.com/office/drawing/2017/decorative" val="1"/>
+              </a:ext>
+            </a:extLst>
+          </p:cNvPr>
+          <p:cNvSpPr>
+            <a:spLocks noGrp="1" noRot="1" noChangeAspect="1" noMove="1" noResize="1" noEditPoints="1" noAdjustHandles="1" noChangeArrowheads="1" noChangeShapeType="1" noTextEdit="1"/>
+          </p:cNvSpPr>
+          <p:nvPr>
+            <p:extLst>
+              <p:ext uri="{386F3935-93C4-4BCD-93E2-E3B085C9AB24}">
+                <p16:designElem xmlns:p16="http://schemas.microsoft.com/office/powerpoint/2015/main" val="1"/>
+              </p:ext>
+            </p:extLst>
+          </p:nvPr>
+        </p:nvSpPr>
+        <p:spPr>
+          <a:xfrm>
+            <a:off x="0" y="0"/>
+            <a:ext cx="12192000" cy="6858000"/>
+          </a:xfrm>
+          <a:prstGeom prst="rect">
+            <a:avLst/>
+          </a:prstGeom>
+          <a:ln>
+            <a:noFill/>
+          </a:ln>
+        </p:spPr>
+        <p:style>
+          <a:lnRef idx="2">
+            <a:schemeClr val="accent1">
+              <a:shade val="50000"/>
+            </a:schemeClr>
+          </a:lnRef>
+          <a:fillRef idx="1">
+            <a:schemeClr val="accent1"/>
+          </a:fillRef>
+          <a:effectRef idx="0">
+            <a:schemeClr val="accent1"/>
+          </a:effectRef>
+          <a:fontRef idx="minor">
+            <a:schemeClr val="lt1"/>
+          </a:fontRef>
+        </p:style>
+        <p:txBody>
+          <a:bodyPr rtlCol="0" anchor="ctr"/>
+          <a:lstStyle/>
+          <a:p>
+            <a:pPr algn="ctr"/>
+            <a:endParaRPr lang="en-US"/>
+          </a:p>
+        </p:txBody>
+      </p:sp>
       <p:sp>
         <p:nvSpPr>
           <p:cNvPr id="2" name="Title 1">
@@ -13135,15 +13203,295 @@
             <p:ph type="title"/>
           </p:nvPr>
         </p:nvSpPr>
-        <p:spPr/>
+        <p:spPr>
+          <a:xfrm>
+            <a:off x="630936" y="639520"/>
+            <a:ext cx="3429000" cy="1719072"/>
+          </a:xfrm>
+        </p:spPr>
         <p:txBody>
-          <a:bodyPr/>
+          <a:bodyPr anchor="b">
+            <a:normAutofit/>
+          </a:bodyPr>
           <a:lstStyle/>
           <a:p>
             <a:r>
-              <a:rPr lang="en-US" dirty="0"/>
+              <a:rPr lang="en-US" sz="3800"/>
               <a:t>ERD (Entity-Relationship Diagram)</a:t>
             </a:r>
+          </a:p>
+        </p:txBody>
+      </p:sp>
+      <p:sp>
+        <p:nvSpPr>
+          <p:cNvPr id="13" name="sketch line">
+            <a:extLst>
+              <a:ext uri="{FF2B5EF4-FFF2-40B4-BE49-F238E27FC236}">
+                <a16:creationId xmlns:a16="http://schemas.microsoft.com/office/drawing/2014/main" id="{CD8B4F24-440B-49E9-B85D-733523DC064B}"/>
+              </a:ext>
+              <a:ext uri="{C183D7F6-B498-43B3-948B-1728B52AA6E4}">
+                <adec:decorative xmlns:adec="http://schemas.microsoft.com/office/drawing/2017/decorative" val="1"/>
+              </a:ext>
+            </a:extLst>
+          </p:cNvPr>
+          <p:cNvSpPr>
+            <a:spLocks noGrp="1" noRot="1" noChangeAspect="1" noMove="1" noResize="1" noEditPoints="1" noAdjustHandles="1" noChangeArrowheads="1" noChangeShapeType="1" noTextEdit="1"/>
+          </p:cNvSpPr>
+          <p:nvPr>
+            <p:extLst>
+              <p:ext uri="{386F3935-93C4-4BCD-93E2-E3B085C9AB24}">
+                <p16:designElem xmlns:p16="http://schemas.microsoft.com/office/powerpoint/2015/main" val="1"/>
+              </p:ext>
+            </p:extLst>
+          </p:nvPr>
+        </p:nvSpPr>
+        <p:spPr>
+          <a:xfrm>
+            <a:off x="643278" y="2573756"/>
+            <a:ext cx="3255095" cy="18288"/>
+          </a:xfrm>
+          <a:custGeom>
+            <a:avLst/>
+            <a:gdLst>
+              <a:gd name="csX0" fmla="*/ 0 w 3255095"/>
+              <a:gd name="csY0" fmla="*/ 0 h 18288"/>
+              <a:gd name="csX1" fmla="*/ 618468 w 3255095"/>
+              <a:gd name="csY1" fmla="*/ 0 h 18288"/>
+              <a:gd name="csX2" fmla="*/ 1269487 w 3255095"/>
+              <a:gd name="csY2" fmla="*/ 0 h 18288"/>
+              <a:gd name="csX3" fmla="*/ 1953057 w 3255095"/>
+              <a:gd name="csY3" fmla="*/ 0 h 18288"/>
+              <a:gd name="csX4" fmla="*/ 2636627 w 3255095"/>
+              <a:gd name="csY4" fmla="*/ 0 h 18288"/>
+              <a:gd name="csX5" fmla="*/ 3255095 w 3255095"/>
+              <a:gd name="csY5" fmla="*/ 0 h 18288"/>
+              <a:gd name="csX6" fmla="*/ 3255095 w 3255095"/>
+              <a:gd name="csY6" fmla="*/ 18288 h 18288"/>
+              <a:gd name="csX7" fmla="*/ 2538974 w 3255095"/>
+              <a:gd name="csY7" fmla="*/ 18288 h 18288"/>
+              <a:gd name="csX8" fmla="*/ 1822853 w 3255095"/>
+              <a:gd name="csY8" fmla="*/ 18288 h 18288"/>
+              <a:gd name="csX9" fmla="*/ 1171834 w 3255095"/>
+              <a:gd name="csY9" fmla="*/ 18288 h 18288"/>
+              <a:gd name="csX10" fmla="*/ 0 w 3255095"/>
+              <a:gd name="csY10" fmla="*/ 18288 h 18288"/>
+              <a:gd name="csX11" fmla="*/ 0 w 3255095"/>
+              <a:gd name="csY11" fmla="*/ 0 h 18288"/>
+            </a:gdLst>
+            <a:ahLst/>
+            <a:cxnLst>
+              <a:cxn ang="0">
+                <a:pos x="csX0" y="csY0"/>
+              </a:cxn>
+              <a:cxn ang="0">
+                <a:pos x="csX1" y="csY1"/>
+              </a:cxn>
+              <a:cxn ang="0">
+                <a:pos x="csX2" y="csY2"/>
+              </a:cxn>
+              <a:cxn ang="0">
+                <a:pos x="csX3" y="csY3"/>
+              </a:cxn>
+              <a:cxn ang="0">
+                <a:pos x="csX4" y="csY4"/>
+              </a:cxn>
+              <a:cxn ang="0">
+                <a:pos x="csX5" y="csY5"/>
+              </a:cxn>
+              <a:cxn ang="0">
+                <a:pos x="csX6" y="csY6"/>
+              </a:cxn>
+              <a:cxn ang="0">
+                <a:pos x="csX7" y="csY7"/>
+              </a:cxn>
+              <a:cxn ang="0">
+                <a:pos x="csX8" y="csY8"/>
+              </a:cxn>
+              <a:cxn ang="0">
+                <a:pos x="csX9" y="csY9"/>
+              </a:cxn>
+              <a:cxn ang="0">
+                <a:pos x="csX10" y="csY10"/>
+              </a:cxn>
+              <a:cxn ang="0">
+                <a:pos x="csX11" y="csY11"/>
+              </a:cxn>
+            </a:cxnLst>
+            <a:rect l="l" t="t" r="r" b="b"/>
+            <a:pathLst>
+              <a:path w="3255095" h="18288" fill="none" extrusionOk="0">
+                <a:moveTo>
+                  <a:pt x="0" y="0"/>
+                </a:moveTo>
+                <a:cubicBezTo>
+                  <a:pt x="240201" y="-22123"/>
+                  <a:pt x="462021" y="-19623"/>
+                  <a:pt x="618468" y="0"/>
+                </a:cubicBezTo>
+                <a:cubicBezTo>
+                  <a:pt x="774915" y="19623"/>
+                  <a:pt x="974734" y="2035"/>
+                  <a:pt x="1269487" y="0"/>
+                </a:cubicBezTo>
+                <a:cubicBezTo>
+                  <a:pt x="1564240" y="-2035"/>
+                  <a:pt x="1733579" y="10639"/>
+                  <a:pt x="1953057" y="0"/>
+                </a:cubicBezTo>
+                <a:cubicBezTo>
+                  <a:pt x="2172535" y="-10639"/>
+                  <a:pt x="2453962" y="14018"/>
+                  <a:pt x="2636627" y="0"/>
+                </a:cubicBezTo>
+                <a:cubicBezTo>
+                  <a:pt x="2819292" y="-14018"/>
+                  <a:pt x="3121375" y="5399"/>
+                  <a:pt x="3255095" y="0"/>
+                </a:cubicBezTo>
+                <a:cubicBezTo>
+                  <a:pt x="3254386" y="8157"/>
+                  <a:pt x="3254682" y="12125"/>
+                  <a:pt x="3255095" y="18288"/>
+                </a:cubicBezTo>
+                <a:cubicBezTo>
+                  <a:pt x="3088545" y="23203"/>
+                  <a:pt x="2687475" y="7419"/>
+                  <a:pt x="2538974" y="18288"/>
+                </a:cubicBezTo>
+                <a:cubicBezTo>
+                  <a:pt x="2390473" y="29157"/>
+                  <a:pt x="2137381" y="-8959"/>
+                  <a:pt x="1822853" y="18288"/>
+                </a:cubicBezTo>
+                <a:cubicBezTo>
+                  <a:pt x="1508325" y="45535"/>
+                  <a:pt x="1466437" y="20385"/>
+                  <a:pt x="1171834" y="18288"/>
+                </a:cubicBezTo>
+                <a:cubicBezTo>
+                  <a:pt x="877231" y="16191"/>
+                  <a:pt x="561097" y="37643"/>
+                  <a:pt x="0" y="18288"/>
+                </a:cubicBezTo>
+                <a:cubicBezTo>
+                  <a:pt x="-46" y="12483"/>
+                  <a:pt x="-203" y="6491"/>
+                  <a:pt x="0" y="0"/>
+                </a:cubicBezTo>
+                <a:close/>
+              </a:path>
+              <a:path w="3255095" h="18288" stroke="0" extrusionOk="0">
+                <a:moveTo>
+                  <a:pt x="0" y="0"/>
+                </a:moveTo>
+                <a:cubicBezTo>
+                  <a:pt x="291965" y="19429"/>
+                  <a:pt x="363155" y="8568"/>
+                  <a:pt x="618468" y="0"/>
+                </a:cubicBezTo>
+                <a:cubicBezTo>
+                  <a:pt x="873781" y="-8568"/>
+                  <a:pt x="904459" y="-19505"/>
+                  <a:pt x="1171834" y="0"/>
+                </a:cubicBezTo>
+                <a:cubicBezTo>
+                  <a:pt x="1439209" y="19505"/>
+                  <a:pt x="1744369" y="9790"/>
+                  <a:pt x="1887955" y="0"/>
+                </a:cubicBezTo>
+                <a:cubicBezTo>
+                  <a:pt x="2031541" y="-9790"/>
+                  <a:pt x="2346378" y="21240"/>
+                  <a:pt x="2506423" y="0"/>
+                </a:cubicBezTo>
+                <a:cubicBezTo>
+                  <a:pt x="2666468" y="-21240"/>
+                  <a:pt x="2990257" y="30414"/>
+                  <a:pt x="3255095" y="0"/>
+                </a:cubicBezTo>
+                <a:cubicBezTo>
+                  <a:pt x="3254831" y="4493"/>
+                  <a:pt x="3255479" y="9472"/>
+                  <a:pt x="3255095" y="18288"/>
+                </a:cubicBezTo>
+                <a:cubicBezTo>
+                  <a:pt x="3120743" y="16690"/>
+                  <a:pt x="2759628" y="42462"/>
+                  <a:pt x="2604076" y="18288"/>
+                </a:cubicBezTo>
+                <a:cubicBezTo>
+                  <a:pt x="2448524" y="-5886"/>
+                  <a:pt x="2184336" y="19599"/>
+                  <a:pt x="1887955" y="18288"/>
+                </a:cubicBezTo>
+                <a:cubicBezTo>
+                  <a:pt x="1591574" y="16977"/>
+                  <a:pt x="1548845" y="6870"/>
+                  <a:pt x="1334589" y="18288"/>
+                </a:cubicBezTo>
+                <a:cubicBezTo>
+                  <a:pt x="1120333" y="29706"/>
+                  <a:pt x="996014" y="9662"/>
+                  <a:pt x="683570" y="18288"/>
+                </a:cubicBezTo>
+                <a:cubicBezTo>
+                  <a:pt x="371126" y="26914"/>
+                  <a:pt x="198687" y="16167"/>
+                  <a:pt x="0" y="18288"/>
+                </a:cubicBezTo>
+                <a:cubicBezTo>
+                  <a:pt x="843" y="9577"/>
+                  <a:pt x="371" y="6900"/>
+                  <a:pt x="0" y="0"/>
+                </a:cubicBezTo>
+                <a:close/>
+              </a:path>
+            </a:pathLst>
+          </a:custGeom>
+          <a:solidFill>
+            <a:schemeClr val="accent2"/>
+          </a:solidFill>
+          <a:ln w="38100" cap="rnd">
+            <a:solidFill>
+              <a:schemeClr val="accent2"/>
+            </a:solidFill>
+            <a:round/>
+            <a:extLst>
+              <a:ext uri="{C807C97D-BFC1-408E-A445-0C87EB9F89A2}">
+                <ask:lineSketchStyleProps xmlns:ask="http://schemas.microsoft.com/office/drawing/2018/sketchyshapes" sd="1219033472">
+                  <a:prstGeom prst="rect">
+                    <a:avLst/>
+                  </a:prstGeom>
+                  <ask:type>
+                    <ask:lineSketchFreehand/>
+                  </ask:type>
+                </ask:lineSketchStyleProps>
+              </a:ext>
+            </a:extLst>
+          </a:ln>
+        </p:spPr>
+        <p:style>
+          <a:lnRef idx="2">
+            <a:schemeClr val="accent1">
+              <a:shade val="50000"/>
+            </a:schemeClr>
+          </a:lnRef>
+          <a:fillRef idx="1">
+            <a:schemeClr val="accent1"/>
+          </a:fillRef>
+          <a:effectRef idx="0">
+            <a:schemeClr val="accent1"/>
+          </a:effectRef>
+          <a:fontRef idx="minor">
+            <a:schemeClr val="lt1"/>
+          </a:fontRef>
+        </p:style>
+        <p:txBody>
+          <a:bodyPr rtlCol="0" anchor="ctr"/>
+          <a:lstStyle/>
+          <a:p>
+            <a:pPr algn="ctr"/>
+            <a:endParaRPr lang="en-US"/>
           </a:p>
         </p:txBody>
       </p:sp>
@@ -13165,13 +13513,13 @@
         </p:nvSpPr>
         <p:spPr>
           <a:xfrm>
-            <a:off x="838200" y="1825625"/>
-            <a:ext cx="3816927" cy="4351338"/>
+            <a:off x="630936" y="2807208"/>
+            <a:ext cx="3429000" cy="3410712"/>
           </a:xfrm>
         </p:spPr>
         <p:txBody>
-          <a:bodyPr>
-            <a:normAutofit fontScale="55000" lnSpcReduction="20000"/>
+          <a:bodyPr anchor="t">
+            <a:normAutofit/>
           </a:bodyPr>
           <a:lstStyle/>
           <a:p>
@@ -13179,56 +13527,56 @@
               <a:buNone/>
             </a:pPr>
             <a:r>
-              <a:rPr lang="en-US" b="1" dirty="0"/>
+              <a:rPr lang="en-US" sz="700" b="1"/>
               <a:t>Entities Included:</a:t>
             </a:r>
-            <a:endParaRPr lang="en-US" dirty="0"/>
-          </a:p>
-          <a:p>
-            <a:r>
-              <a:rPr lang="en-US" dirty="0"/>
+            <a:endParaRPr lang="en-US" sz="700"/>
+          </a:p>
+          <a:p>
+            <a:r>
+              <a:rPr lang="en-US" sz="700"/>
               <a:t>Employee</a:t>
             </a:r>
           </a:p>
           <a:p>
             <a:r>
-              <a:rPr lang="en-US" dirty="0"/>
+              <a:rPr lang="en-US" sz="700"/>
               <a:t>Region</a:t>
             </a:r>
           </a:p>
           <a:p>
             <a:r>
-              <a:rPr lang="en-US" dirty="0"/>
+              <a:rPr lang="en-US" sz="700"/>
               <a:t>Trip</a:t>
             </a:r>
           </a:p>
           <a:p>
             <a:r>
-              <a:rPr lang="en-US" dirty="0"/>
+              <a:rPr lang="en-US" sz="700"/>
               <a:t>Customer</a:t>
             </a:r>
           </a:p>
           <a:p>
             <a:r>
-              <a:rPr lang="en-US" dirty="0"/>
+              <a:rPr lang="en-US" sz="700"/>
               <a:t>Booking</a:t>
             </a:r>
           </a:p>
           <a:p>
             <a:r>
-              <a:rPr lang="en-US" dirty="0"/>
+              <a:rPr lang="en-US" sz="700"/>
               <a:t>Equipment</a:t>
             </a:r>
           </a:p>
           <a:p>
             <a:r>
-              <a:rPr lang="en-US" dirty="0"/>
+              <a:rPr lang="en-US" sz="700"/>
               <a:t>Equipment_Order</a:t>
             </a:r>
           </a:p>
           <a:p>
             <a:r>
-              <a:rPr lang="en-US" dirty="0"/>
+              <a:rPr lang="en-US" sz="700"/>
               <a:t>Order_Line</a:t>
             </a:r>
           </a:p>
@@ -13237,46 +13585,46 @@
               <a:buNone/>
             </a:pPr>
             <a:r>
-              <a:rPr lang="en-US" b="1" dirty="0"/>
+              <a:rPr lang="en-US" sz="700" b="1"/>
               <a:t>Key Relationships:</a:t>
             </a:r>
-            <a:endParaRPr lang="en-US" dirty="0"/>
-          </a:p>
-          <a:p>
-            <a:r>
-              <a:rPr lang="en-US" dirty="0"/>
+            <a:endParaRPr lang="en-US" sz="700"/>
+          </a:p>
+          <a:p>
+            <a:r>
+              <a:rPr lang="en-US" sz="700"/>
               <a:t>Employees guide trips and manage equipment</a:t>
             </a:r>
           </a:p>
           <a:p>
             <a:r>
-              <a:rPr lang="en-US" dirty="0"/>
+              <a:rPr lang="en-US" sz="700"/>
               <a:t>Customers book trips and place orders</a:t>
             </a:r>
           </a:p>
           <a:p>
             <a:r>
-              <a:rPr lang="en-US" dirty="0"/>
+              <a:rPr lang="en-US" sz="700"/>
               <a:t>Regions contain multiple trips</a:t>
             </a:r>
           </a:p>
           <a:p>
             <a:r>
-              <a:rPr lang="en-US" dirty="0"/>
+              <a:rPr lang="en-US" sz="700"/>
               <a:t>Orders contain multiple line items</a:t>
             </a:r>
           </a:p>
           <a:p>
-            <a:endParaRPr lang="en-US" dirty="0"/>
+            <a:endParaRPr lang="en-US" sz="700"/>
           </a:p>
         </p:txBody>
       </p:sp>
       <p:pic>
         <p:nvPicPr>
-          <p:cNvPr id="5" name="Picture 4" descr="A diagram of a company&#10;&#10;AI-generated content may be incorrect.">
+          <p:cNvPr id="6" name="Picture 5" descr="A diagram of a database&#10;&#10;AI-generated content may be incorrect.">
             <a:extLst>
               <a:ext uri="{FF2B5EF4-FFF2-40B4-BE49-F238E27FC236}">
-                <a16:creationId xmlns:a16="http://schemas.microsoft.com/office/drawing/2014/main" id="{64BA8A18-6DBD-4793-5F20-38A5C3B61017}"/>
+                <a16:creationId xmlns:a16="http://schemas.microsoft.com/office/drawing/2014/main" id="{7CEFE3E3-059D-80E0-4C16-5FF9FCBDDF9C}"/>
               </a:ext>
             </a:extLst>
           </p:cNvPr>
@@ -13293,8 +13641,8 @@
         </p:blipFill>
         <p:spPr>
           <a:xfrm>
-            <a:off x="4292600" y="1489075"/>
-            <a:ext cx="7061200" cy="5003800"/>
+            <a:off x="4654296" y="1116254"/>
+            <a:ext cx="6903720" cy="4625492"/>
           </a:xfrm>
           <a:prstGeom prst="rect">
             <a:avLst/>

</xml_diff>